<commit_message>
Fix slide 2 formatting: widen heading boxes, remove misplaced accent line
Co-Authored-By: Claude Opus 4.6 <noreply@anthropic.com>
</commit_message>
<xml_diff>
--- a/assets/Lima_Market_Redesigned.pptx
+++ b/assets/Lima_Market_Redesigned.pptx
@@ -15149,26 +15149,6 @@
       </p:sp>
       <p:sp>
         <p:nvSpPr>
-          <p:cNvPr id="3" name="Shape 1"/>
-          <p:cNvSpPr/>
-          <p:nvPr/>
-        </p:nvSpPr>
-        <p:spPr>
-          <a:xfrm>
-            <a:off x="548640" y="914400"/>
-            <a:ext cx="548640" cy="32004"/>
-          </a:xfrm>
-          <a:prstGeom prst="rect">
-            <a:avLst/>
-          </a:prstGeom>
-          <a:solidFill>
-            <a:srgbClr val="E07A5F"/>
-          </a:solidFill>
-          <a:ln/>
-        </p:spPr>
-      </p:sp>
-      <p:sp>
-        <p:nvSpPr>
           <p:cNvPr id="4" name="Text 2"/>
           <p:cNvSpPr/>
           <p:nvPr/>
@@ -15215,7 +15195,7 @@
         <p:spPr>
           <a:xfrm>
             <a:off x="1097280" y="1234440"/>
-            <a:ext cx="3657600" cy="274320"/>
+            <a:ext cx="7498080" cy="274320"/>
           </a:xfrm>
           <a:prstGeom prst="rect">
             <a:avLst/>
@@ -15332,7 +15312,7 @@
         <p:spPr>
           <a:xfrm>
             <a:off x="1097280" y="1892808"/>
-            <a:ext cx="3657600" cy="274320"/>
+            <a:ext cx="7498080" cy="274320"/>
           </a:xfrm>
           <a:prstGeom prst="rect">
             <a:avLst/>
@@ -15449,7 +15429,7 @@
         <p:spPr>
           <a:xfrm>
             <a:off x="1097280" y="2551176"/>
-            <a:ext cx="3657600" cy="274320"/>
+            <a:ext cx="7498080" cy="274320"/>
           </a:xfrm>
           <a:prstGeom prst="rect">
             <a:avLst/>
@@ -15566,7 +15546,7 @@
         <p:spPr>
           <a:xfrm>
             <a:off x="1097280" y="3209544"/>
-            <a:ext cx="3657600" cy="274320"/>
+            <a:ext cx="7498080" cy="274320"/>
           </a:xfrm>
           <a:prstGeom prst="rect">
             <a:avLst/>
@@ -15683,7 +15663,7 @@
         <p:spPr>
           <a:xfrm>
             <a:off x="1097280" y="3867912"/>
-            <a:ext cx="3657600" cy="274320"/>
+            <a:ext cx="7498080" cy="274320"/>
           </a:xfrm>
           <a:prstGeom prst="rect">
             <a:avLst/>

</xml_diff>